<commit_message>
kickoff viaticos correcciones texto
</commit_message>
<xml_diff>
--- a/Proyectos/Viaticos/02. Planeación/Viaticos-KickOff.pptx
+++ b/Proyectos/Viaticos/02. Planeación/Viaticos-KickOff.pptx
@@ -41,7 +41,7 @@
       </p:grpSpPr>
       <p:sp>
         <p:nvSpPr>
-          <p:cNvPr id="73" name="PlaceHolder 1"/>
+          <p:cNvPr id="72" name="PlaceHolder 1"/>
           <p:cNvSpPr>
             <a:spLocks noGrp="1"/>
           </p:cNvSpPr>
@@ -73,7 +73,7 @@
       </p:sp>
       <p:sp>
         <p:nvSpPr>
-          <p:cNvPr id="74" name="PlaceHolder 2"/>
+          <p:cNvPr id="73" name="PlaceHolder 2"/>
           <p:cNvSpPr>
             <a:spLocks noGrp="1"/>
           </p:cNvSpPr>
@@ -105,7 +105,7 @@
       </p:sp>
       <p:sp>
         <p:nvSpPr>
-          <p:cNvPr id="75" name="PlaceHolder 3"/>
+          <p:cNvPr id="74" name="PlaceHolder 3"/>
           <p:cNvSpPr>
             <a:spLocks noGrp="1"/>
           </p:cNvSpPr>
@@ -138,7 +138,7 @@
       </p:sp>
       <p:sp>
         <p:nvSpPr>
-          <p:cNvPr id="76" name="PlaceHolder 4"/>
+          <p:cNvPr id="75" name="PlaceHolder 4"/>
           <p:cNvSpPr>
             <a:spLocks noGrp="1"/>
           </p:cNvSpPr>
@@ -170,7 +170,7 @@
       </p:sp>
       <p:sp>
         <p:nvSpPr>
-          <p:cNvPr id="77" name="PlaceHolder 5"/>
+          <p:cNvPr id="76" name="PlaceHolder 5"/>
           <p:cNvSpPr>
             <a:spLocks noGrp="1"/>
           </p:cNvSpPr>
@@ -191,7 +191,7 @@
           <a:bodyPr lIns="0" rIns="0" tIns="0" bIns="0" anchor="b"/>
           <a:p>
             <a:pPr algn="r"/>
-            <a:fld id="{1D12CEAC-E1AB-42F5-8252-C386A007F024}" type="slidenum">
+            <a:fld id="{9ACD5956-06EB-4EA3-A399-9BF70607AD36}" type="slidenum">
               <a:rPr lang="es-MX" sz="1400">
                 <a:latin typeface="Times New Roman"/>
               </a:rPr>
@@ -226,7 +226,7 @@
       </p:grpSpPr>
       <p:sp>
         <p:nvSpPr>
-          <p:cNvPr id="116" name="PlaceHolder 1"/>
+          <p:cNvPr id="115" name="PlaceHolder 1"/>
           <p:cNvSpPr>
             <a:spLocks noGrp="1"/>
           </p:cNvSpPr>
@@ -237,7 +237,7 @@
         <p:spPr>
           <a:xfrm>
             <a:off x="685800" y="4343400"/>
-            <a:ext cx="5485680" cy="4114080"/>
+            <a:ext cx="5485320" cy="4113720"/>
           </a:xfrm>
           <a:prstGeom prst="rect">
             <a:avLst/>
@@ -252,14 +252,14 @@
       </p:sp>
       <p:sp>
         <p:nvSpPr>
-          <p:cNvPr id="117" name="CustomShape 2"/>
+          <p:cNvPr id="116" name="CustomShape 2"/>
           <p:cNvSpPr/>
           <p:nvPr/>
         </p:nvSpPr>
         <p:spPr>
           <a:xfrm>
             <a:off x="3884760" y="8685360"/>
-            <a:ext cx="2971080" cy="456480"/>
+            <a:ext cx="2970720" cy="456120"/>
           </a:xfrm>
           <a:prstGeom prst="rect">
             <a:avLst/>
@@ -283,7 +283,7 @@
                 <a:spcPct val="100000"/>
               </a:lnSpc>
             </a:pPr>
-            <a:fld id="{47A18DC6-A933-4842-989A-33814A0F0887}" type="slidenum">
+            <a:fld id="{44514A71-10E6-491C-8C69-75EFE1E7CEF5}" type="slidenum">
               <a:rPr lang="es-MX" sz="1200" strike="noStrike">
                 <a:solidFill>
                   <a:srgbClr val="000000"/>
@@ -343,7 +343,7 @@
       </p:grpSpPr>
       <p:sp>
         <p:nvSpPr>
-          <p:cNvPr id="24" name="PlaceHolder 1"/>
+          <p:cNvPr id="23" name="PlaceHolder 1"/>
           <p:cNvSpPr>
             <a:spLocks noGrp="1"/>
           </p:cNvSpPr>
@@ -370,7 +370,7 @@
       </p:sp>
       <p:sp>
         <p:nvSpPr>
-          <p:cNvPr id="25" name="PlaceHolder 2"/>
+          <p:cNvPr id="24" name="PlaceHolder 2"/>
           <p:cNvSpPr>
             <a:spLocks noGrp="1"/>
           </p:cNvSpPr>
@@ -396,7 +396,7 @@
       </p:sp>
       <p:sp>
         <p:nvSpPr>
-          <p:cNvPr id="26" name="PlaceHolder 3"/>
+          <p:cNvPr id="25" name="PlaceHolder 3"/>
           <p:cNvSpPr>
             <a:spLocks noGrp="1"/>
           </p:cNvSpPr>
@@ -444,7 +444,7 @@
       </p:grpSpPr>
       <p:sp>
         <p:nvSpPr>
-          <p:cNvPr id="27" name="PlaceHolder 1"/>
+          <p:cNvPr id="26" name="PlaceHolder 1"/>
           <p:cNvSpPr>
             <a:spLocks noGrp="1"/>
           </p:cNvSpPr>
@@ -471,7 +471,7 @@
       </p:sp>
       <p:sp>
         <p:nvSpPr>
-          <p:cNvPr id="28" name="PlaceHolder 2"/>
+          <p:cNvPr id="27" name="PlaceHolder 2"/>
           <p:cNvSpPr>
             <a:spLocks noGrp="1"/>
           </p:cNvSpPr>
@@ -497,7 +497,7 @@
       </p:sp>
       <p:sp>
         <p:nvSpPr>
-          <p:cNvPr id="29" name="PlaceHolder 3"/>
+          <p:cNvPr id="28" name="PlaceHolder 3"/>
           <p:cNvSpPr>
             <a:spLocks noGrp="1"/>
           </p:cNvSpPr>
@@ -523,7 +523,7 @@
       </p:sp>
       <p:sp>
         <p:nvSpPr>
-          <p:cNvPr id="30" name="PlaceHolder 4"/>
+          <p:cNvPr id="29" name="PlaceHolder 4"/>
           <p:cNvSpPr>
             <a:spLocks noGrp="1"/>
           </p:cNvSpPr>
@@ -549,7 +549,7 @@
       </p:sp>
       <p:sp>
         <p:nvSpPr>
-          <p:cNvPr id="31" name="PlaceHolder 5"/>
+          <p:cNvPr id="30" name="PlaceHolder 5"/>
           <p:cNvSpPr>
             <a:spLocks noGrp="1"/>
           </p:cNvSpPr>
@@ -597,7 +597,7 @@
       </p:grpSpPr>
       <p:sp>
         <p:nvSpPr>
-          <p:cNvPr id="32" name="PlaceHolder 1"/>
+          <p:cNvPr id="31" name="PlaceHolder 1"/>
           <p:cNvSpPr>
             <a:spLocks noGrp="1"/>
           </p:cNvSpPr>
@@ -624,7 +624,7 @@
       </p:sp>
       <p:sp>
         <p:nvSpPr>
-          <p:cNvPr id="33" name="PlaceHolder 2"/>
+          <p:cNvPr id="32" name="PlaceHolder 2"/>
           <p:cNvSpPr>
             <a:spLocks noGrp="1"/>
           </p:cNvSpPr>
@@ -650,7 +650,7 @@
       </p:sp>
       <p:sp>
         <p:nvSpPr>
-          <p:cNvPr id="34" name="PlaceHolder 3"/>
+          <p:cNvPr id="33" name="PlaceHolder 3"/>
           <p:cNvSpPr>
             <a:spLocks noGrp="1"/>
           </p:cNvSpPr>
@@ -676,7 +676,7 @@
       </p:sp>
       <p:pic>
         <p:nvPicPr>
-          <p:cNvPr id="35" name="" descr=""/>
+          <p:cNvPr id="34" name="" descr=""/>
           <p:cNvPicPr/>
           <p:nvPr/>
         </p:nvPicPr>
@@ -699,7 +699,7 @@
       </p:pic>
       <p:pic>
         <p:nvPicPr>
-          <p:cNvPr id="36" name="" descr=""/>
+          <p:cNvPr id="35" name="" descr=""/>
           <p:cNvPicPr/>
           <p:nvPr/>
         </p:nvPicPr>
@@ -766,7 +766,7 @@
       </p:grpSpPr>
       <p:sp>
         <p:nvSpPr>
-          <p:cNvPr id="39" name="PlaceHolder 1"/>
+          <p:cNvPr id="38" name="PlaceHolder 1"/>
           <p:cNvSpPr>
             <a:spLocks noGrp="1"/>
           </p:cNvSpPr>
@@ -793,7 +793,7 @@
       </p:sp>
       <p:sp>
         <p:nvSpPr>
-          <p:cNvPr id="40" name="PlaceHolder 2"/>
+          <p:cNvPr id="39" name="PlaceHolder 2"/>
           <p:cNvSpPr>
             <a:spLocks noGrp="1"/>
           </p:cNvSpPr>
@@ -842,7 +842,7 @@
       </p:grpSpPr>
       <p:sp>
         <p:nvSpPr>
-          <p:cNvPr id="41" name="PlaceHolder 1"/>
+          <p:cNvPr id="40" name="PlaceHolder 1"/>
           <p:cNvSpPr>
             <a:spLocks noGrp="1"/>
           </p:cNvSpPr>
@@ -869,7 +869,7 @@
       </p:sp>
       <p:sp>
         <p:nvSpPr>
-          <p:cNvPr id="42" name="PlaceHolder 2"/>
+          <p:cNvPr id="41" name="PlaceHolder 2"/>
           <p:cNvSpPr>
             <a:spLocks noGrp="1"/>
           </p:cNvSpPr>
@@ -917,7 +917,7 @@
       </p:grpSpPr>
       <p:sp>
         <p:nvSpPr>
-          <p:cNvPr id="43" name="PlaceHolder 1"/>
+          <p:cNvPr id="42" name="PlaceHolder 1"/>
           <p:cNvSpPr>
             <a:spLocks noGrp="1"/>
           </p:cNvSpPr>
@@ -944,7 +944,7 @@
       </p:sp>
       <p:sp>
         <p:nvSpPr>
-          <p:cNvPr id="44" name="PlaceHolder 2"/>
+          <p:cNvPr id="43" name="PlaceHolder 2"/>
           <p:cNvSpPr>
             <a:spLocks noGrp="1"/>
           </p:cNvSpPr>
@@ -970,7 +970,7 @@
       </p:sp>
       <p:sp>
         <p:nvSpPr>
-          <p:cNvPr id="45" name="PlaceHolder 3"/>
+          <p:cNvPr id="44" name="PlaceHolder 3"/>
           <p:cNvSpPr>
             <a:spLocks noGrp="1"/>
           </p:cNvSpPr>
@@ -1018,7 +1018,7 @@
       </p:grpSpPr>
       <p:sp>
         <p:nvSpPr>
-          <p:cNvPr id="46" name="PlaceHolder 1"/>
+          <p:cNvPr id="45" name="PlaceHolder 1"/>
           <p:cNvSpPr>
             <a:spLocks noGrp="1"/>
           </p:cNvSpPr>
@@ -1067,7 +1067,7 @@
       </p:grpSpPr>
       <p:sp>
         <p:nvSpPr>
-          <p:cNvPr id="47" name="PlaceHolder 1"/>
+          <p:cNvPr id="46" name="PlaceHolder 1"/>
           <p:cNvSpPr>
             <a:spLocks noGrp="1"/>
           </p:cNvSpPr>
@@ -1116,7 +1116,7 @@
       </p:grpSpPr>
       <p:sp>
         <p:nvSpPr>
-          <p:cNvPr id="48" name="PlaceHolder 1"/>
+          <p:cNvPr id="47" name="PlaceHolder 1"/>
           <p:cNvSpPr>
             <a:spLocks noGrp="1"/>
           </p:cNvSpPr>
@@ -1143,7 +1143,7 @@
       </p:sp>
       <p:sp>
         <p:nvSpPr>
-          <p:cNvPr id="49" name="PlaceHolder 2"/>
+          <p:cNvPr id="48" name="PlaceHolder 2"/>
           <p:cNvSpPr>
             <a:spLocks noGrp="1"/>
           </p:cNvSpPr>
@@ -1169,7 +1169,7 @@
       </p:sp>
       <p:sp>
         <p:nvSpPr>
-          <p:cNvPr id="50" name="PlaceHolder 3"/>
+          <p:cNvPr id="49" name="PlaceHolder 3"/>
           <p:cNvSpPr>
             <a:spLocks noGrp="1"/>
           </p:cNvSpPr>
@@ -1195,7 +1195,7 @@
       </p:sp>
       <p:sp>
         <p:nvSpPr>
-          <p:cNvPr id="51" name="PlaceHolder 4"/>
+          <p:cNvPr id="50" name="PlaceHolder 4"/>
           <p:cNvSpPr>
             <a:spLocks noGrp="1"/>
           </p:cNvSpPr>
@@ -1243,7 +1243,7 @@
       </p:grpSpPr>
       <p:sp>
         <p:nvSpPr>
-          <p:cNvPr id="3" name="PlaceHolder 1"/>
+          <p:cNvPr id="2" name="PlaceHolder 1"/>
           <p:cNvSpPr>
             <a:spLocks noGrp="1"/>
           </p:cNvSpPr>
@@ -1270,7 +1270,7 @@
       </p:sp>
       <p:sp>
         <p:nvSpPr>
-          <p:cNvPr id="4" name="PlaceHolder 2"/>
+          <p:cNvPr id="3" name="PlaceHolder 2"/>
           <p:cNvSpPr>
             <a:spLocks noGrp="1"/>
           </p:cNvSpPr>
@@ -1319,7 +1319,7 @@
       </p:grpSpPr>
       <p:sp>
         <p:nvSpPr>
-          <p:cNvPr id="52" name="PlaceHolder 1"/>
+          <p:cNvPr id="51" name="PlaceHolder 1"/>
           <p:cNvSpPr>
             <a:spLocks noGrp="1"/>
           </p:cNvSpPr>
@@ -1346,7 +1346,7 @@
       </p:sp>
       <p:sp>
         <p:nvSpPr>
-          <p:cNvPr id="53" name="PlaceHolder 2"/>
+          <p:cNvPr id="52" name="PlaceHolder 2"/>
           <p:cNvSpPr>
             <a:spLocks noGrp="1"/>
           </p:cNvSpPr>
@@ -1372,7 +1372,7 @@
       </p:sp>
       <p:sp>
         <p:nvSpPr>
-          <p:cNvPr id="54" name="PlaceHolder 3"/>
+          <p:cNvPr id="53" name="PlaceHolder 3"/>
           <p:cNvSpPr>
             <a:spLocks noGrp="1"/>
           </p:cNvSpPr>
@@ -1398,7 +1398,7 @@
       </p:sp>
       <p:sp>
         <p:nvSpPr>
-          <p:cNvPr id="55" name="PlaceHolder 4"/>
+          <p:cNvPr id="54" name="PlaceHolder 4"/>
           <p:cNvSpPr>
             <a:spLocks noGrp="1"/>
           </p:cNvSpPr>
@@ -1446,7 +1446,7 @@
       </p:grpSpPr>
       <p:sp>
         <p:nvSpPr>
-          <p:cNvPr id="56" name="PlaceHolder 1"/>
+          <p:cNvPr id="55" name="PlaceHolder 1"/>
           <p:cNvSpPr>
             <a:spLocks noGrp="1"/>
           </p:cNvSpPr>
@@ -1473,7 +1473,7 @@
       </p:sp>
       <p:sp>
         <p:nvSpPr>
-          <p:cNvPr id="57" name="PlaceHolder 2"/>
+          <p:cNvPr id="56" name="PlaceHolder 2"/>
           <p:cNvSpPr>
             <a:spLocks noGrp="1"/>
           </p:cNvSpPr>
@@ -1499,7 +1499,7 @@
       </p:sp>
       <p:sp>
         <p:nvSpPr>
-          <p:cNvPr id="58" name="PlaceHolder 3"/>
+          <p:cNvPr id="57" name="PlaceHolder 3"/>
           <p:cNvSpPr>
             <a:spLocks noGrp="1"/>
           </p:cNvSpPr>
@@ -1525,7 +1525,7 @@
       </p:sp>
       <p:sp>
         <p:nvSpPr>
-          <p:cNvPr id="59" name="PlaceHolder 4"/>
+          <p:cNvPr id="58" name="PlaceHolder 4"/>
           <p:cNvSpPr>
             <a:spLocks noGrp="1"/>
           </p:cNvSpPr>
@@ -1573,7 +1573,7 @@
       </p:grpSpPr>
       <p:sp>
         <p:nvSpPr>
-          <p:cNvPr id="60" name="PlaceHolder 1"/>
+          <p:cNvPr id="59" name="PlaceHolder 1"/>
           <p:cNvSpPr>
             <a:spLocks noGrp="1"/>
           </p:cNvSpPr>
@@ -1600,7 +1600,7 @@
       </p:sp>
       <p:sp>
         <p:nvSpPr>
-          <p:cNvPr id="61" name="PlaceHolder 2"/>
+          <p:cNvPr id="60" name="PlaceHolder 2"/>
           <p:cNvSpPr>
             <a:spLocks noGrp="1"/>
           </p:cNvSpPr>
@@ -1626,7 +1626,7 @@
       </p:sp>
       <p:sp>
         <p:nvSpPr>
-          <p:cNvPr id="62" name="PlaceHolder 3"/>
+          <p:cNvPr id="61" name="PlaceHolder 3"/>
           <p:cNvSpPr>
             <a:spLocks noGrp="1"/>
           </p:cNvSpPr>
@@ -1674,7 +1674,7 @@
       </p:grpSpPr>
       <p:sp>
         <p:nvSpPr>
-          <p:cNvPr id="63" name="PlaceHolder 1"/>
+          <p:cNvPr id="62" name="PlaceHolder 1"/>
           <p:cNvSpPr>
             <a:spLocks noGrp="1"/>
           </p:cNvSpPr>
@@ -1701,7 +1701,7 @@
       </p:sp>
       <p:sp>
         <p:nvSpPr>
-          <p:cNvPr id="64" name="PlaceHolder 2"/>
+          <p:cNvPr id="63" name="PlaceHolder 2"/>
           <p:cNvSpPr>
             <a:spLocks noGrp="1"/>
           </p:cNvSpPr>
@@ -1727,7 +1727,7 @@
       </p:sp>
       <p:sp>
         <p:nvSpPr>
-          <p:cNvPr id="65" name="PlaceHolder 3"/>
+          <p:cNvPr id="64" name="PlaceHolder 3"/>
           <p:cNvSpPr>
             <a:spLocks noGrp="1"/>
           </p:cNvSpPr>
@@ -1753,7 +1753,7 @@
       </p:sp>
       <p:sp>
         <p:nvSpPr>
-          <p:cNvPr id="66" name="PlaceHolder 4"/>
+          <p:cNvPr id="65" name="PlaceHolder 4"/>
           <p:cNvSpPr>
             <a:spLocks noGrp="1"/>
           </p:cNvSpPr>
@@ -1779,7 +1779,7 @@
       </p:sp>
       <p:sp>
         <p:nvSpPr>
-          <p:cNvPr id="67" name="PlaceHolder 5"/>
+          <p:cNvPr id="66" name="PlaceHolder 5"/>
           <p:cNvSpPr>
             <a:spLocks noGrp="1"/>
           </p:cNvSpPr>
@@ -1827,7 +1827,7 @@
       </p:grpSpPr>
       <p:sp>
         <p:nvSpPr>
-          <p:cNvPr id="68" name="PlaceHolder 1"/>
+          <p:cNvPr id="67" name="PlaceHolder 1"/>
           <p:cNvSpPr>
             <a:spLocks noGrp="1"/>
           </p:cNvSpPr>
@@ -1854,7 +1854,7 @@
       </p:sp>
       <p:sp>
         <p:nvSpPr>
-          <p:cNvPr id="69" name="PlaceHolder 2"/>
+          <p:cNvPr id="68" name="PlaceHolder 2"/>
           <p:cNvSpPr>
             <a:spLocks noGrp="1"/>
           </p:cNvSpPr>
@@ -1880,7 +1880,7 @@
       </p:sp>
       <p:sp>
         <p:nvSpPr>
-          <p:cNvPr id="70" name="PlaceHolder 3"/>
+          <p:cNvPr id="69" name="PlaceHolder 3"/>
           <p:cNvSpPr>
             <a:spLocks noGrp="1"/>
           </p:cNvSpPr>
@@ -1906,7 +1906,7 @@
       </p:sp>
       <p:pic>
         <p:nvPicPr>
-          <p:cNvPr id="71" name="" descr=""/>
+          <p:cNvPr id="70" name="" descr=""/>
           <p:cNvPicPr/>
           <p:nvPr/>
         </p:nvPicPr>
@@ -1929,7 +1929,7 @@
       </p:pic>
       <p:pic>
         <p:nvPicPr>
-          <p:cNvPr id="72" name="" descr=""/>
+          <p:cNvPr id="71" name="" descr=""/>
           <p:cNvPicPr/>
           <p:nvPr/>
         </p:nvPicPr>
@@ -1974,7 +1974,7 @@
       </p:grpSpPr>
       <p:sp>
         <p:nvSpPr>
-          <p:cNvPr id="5" name="PlaceHolder 1"/>
+          <p:cNvPr id="4" name="PlaceHolder 1"/>
           <p:cNvSpPr>
             <a:spLocks noGrp="1"/>
           </p:cNvSpPr>
@@ -2001,7 +2001,7 @@
       </p:sp>
       <p:sp>
         <p:nvSpPr>
-          <p:cNvPr id="6" name="PlaceHolder 2"/>
+          <p:cNvPr id="5" name="PlaceHolder 2"/>
           <p:cNvSpPr>
             <a:spLocks noGrp="1"/>
           </p:cNvSpPr>
@@ -2049,7 +2049,7 @@
       </p:grpSpPr>
       <p:sp>
         <p:nvSpPr>
-          <p:cNvPr id="7" name="PlaceHolder 1"/>
+          <p:cNvPr id="6" name="PlaceHolder 1"/>
           <p:cNvSpPr>
             <a:spLocks noGrp="1"/>
           </p:cNvSpPr>
@@ -2076,7 +2076,7 @@
       </p:sp>
       <p:sp>
         <p:nvSpPr>
-          <p:cNvPr id="8" name="PlaceHolder 2"/>
+          <p:cNvPr id="7" name="PlaceHolder 2"/>
           <p:cNvSpPr>
             <a:spLocks noGrp="1"/>
           </p:cNvSpPr>
@@ -2102,7 +2102,7 @@
       </p:sp>
       <p:sp>
         <p:nvSpPr>
-          <p:cNvPr id="9" name="PlaceHolder 3"/>
+          <p:cNvPr id="8" name="PlaceHolder 3"/>
           <p:cNvSpPr>
             <a:spLocks noGrp="1"/>
           </p:cNvSpPr>
@@ -2150,7 +2150,7 @@
       </p:grpSpPr>
       <p:sp>
         <p:nvSpPr>
-          <p:cNvPr id="10" name="PlaceHolder 1"/>
+          <p:cNvPr id="9" name="PlaceHolder 1"/>
           <p:cNvSpPr>
             <a:spLocks noGrp="1"/>
           </p:cNvSpPr>
@@ -2199,7 +2199,7 @@
       </p:grpSpPr>
       <p:sp>
         <p:nvSpPr>
-          <p:cNvPr id="11" name="PlaceHolder 1"/>
+          <p:cNvPr id="10" name="PlaceHolder 1"/>
           <p:cNvSpPr>
             <a:spLocks noGrp="1"/>
           </p:cNvSpPr>
@@ -2248,7 +2248,7 @@
       </p:grpSpPr>
       <p:sp>
         <p:nvSpPr>
-          <p:cNvPr id="12" name="PlaceHolder 1"/>
+          <p:cNvPr id="11" name="PlaceHolder 1"/>
           <p:cNvSpPr>
             <a:spLocks noGrp="1"/>
           </p:cNvSpPr>
@@ -2275,7 +2275,7 @@
       </p:sp>
       <p:sp>
         <p:nvSpPr>
-          <p:cNvPr id="13" name="PlaceHolder 2"/>
+          <p:cNvPr id="12" name="PlaceHolder 2"/>
           <p:cNvSpPr>
             <a:spLocks noGrp="1"/>
           </p:cNvSpPr>
@@ -2301,7 +2301,7 @@
       </p:sp>
       <p:sp>
         <p:nvSpPr>
-          <p:cNvPr id="14" name="PlaceHolder 3"/>
+          <p:cNvPr id="13" name="PlaceHolder 3"/>
           <p:cNvSpPr>
             <a:spLocks noGrp="1"/>
           </p:cNvSpPr>
@@ -2327,7 +2327,7 @@
       </p:sp>
       <p:sp>
         <p:nvSpPr>
-          <p:cNvPr id="15" name="PlaceHolder 4"/>
+          <p:cNvPr id="14" name="PlaceHolder 4"/>
           <p:cNvSpPr>
             <a:spLocks noGrp="1"/>
           </p:cNvSpPr>
@@ -2375,7 +2375,7 @@
       </p:grpSpPr>
       <p:sp>
         <p:nvSpPr>
-          <p:cNvPr id="16" name="PlaceHolder 1"/>
+          <p:cNvPr id="15" name="PlaceHolder 1"/>
           <p:cNvSpPr>
             <a:spLocks noGrp="1"/>
           </p:cNvSpPr>
@@ -2402,7 +2402,7 @@
       </p:sp>
       <p:sp>
         <p:nvSpPr>
-          <p:cNvPr id="17" name="PlaceHolder 2"/>
+          <p:cNvPr id="16" name="PlaceHolder 2"/>
           <p:cNvSpPr>
             <a:spLocks noGrp="1"/>
           </p:cNvSpPr>
@@ -2428,7 +2428,7 @@
       </p:sp>
       <p:sp>
         <p:nvSpPr>
-          <p:cNvPr id="18" name="PlaceHolder 3"/>
+          <p:cNvPr id="17" name="PlaceHolder 3"/>
           <p:cNvSpPr>
             <a:spLocks noGrp="1"/>
           </p:cNvSpPr>
@@ -2454,7 +2454,7 @@
       </p:sp>
       <p:sp>
         <p:nvSpPr>
-          <p:cNvPr id="19" name="PlaceHolder 4"/>
+          <p:cNvPr id="18" name="PlaceHolder 4"/>
           <p:cNvSpPr>
             <a:spLocks noGrp="1"/>
           </p:cNvSpPr>
@@ -2502,7 +2502,7 @@
       </p:grpSpPr>
       <p:sp>
         <p:nvSpPr>
-          <p:cNvPr id="20" name="PlaceHolder 1"/>
+          <p:cNvPr id="19" name="PlaceHolder 1"/>
           <p:cNvSpPr>
             <a:spLocks noGrp="1"/>
           </p:cNvSpPr>
@@ -2529,7 +2529,7 @@
       </p:sp>
       <p:sp>
         <p:nvSpPr>
-          <p:cNvPr id="21" name="PlaceHolder 2"/>
+          <p:cNvPr id="20" name="PlaceHolder 2"/>
           <p:cNvSpPr>
             <a:spLocks noGrp="1"/>
           </p:cNvSpPr>
@@ -2555,7 +2555,7 @@
       </p:sp>
       <p:sp>
         <p:nvSpPr>
-          <p:cNvPr id="22" name="PlaceHolder 3"/>
+          <p:cNvPr id="21" name="PlaceHolder 3"/>
           <p:cNvSpPr>
             <a:spLocks noGrp="1"/>
           </p:cNvSpPr>
@@ -2581,7 +2581,7 @@
       </p:sp>
       <p:sp>
         <p:nvSpPr>
-          <p:cNvPr id="23" name="PlaceHolder 4"/>
+          <p:cNvPr id="22" name="PlaceHolder 4"/>
           <p:cNvSpPr>
             <a:spLocks noGrp="1"/>
           </p:cNvSpPr>
@@ -2646,8 +2646,8 @@
         </p:nvSpPr>
         <p:spPr>
           <a:xfrm>
-            <a:off x="838080" y="365040"/>
-            <a:ext cx="10514880" cy="1324800"/>
+            <a:off x="609480" y="273600"/>
+            <a:ext cx="10972080" cy="1144440"/>
           </a:xfrm>
           <a:prstGeom prst="rect">
             <a:avLst/>
@@ -2668,40 +2668,13 @@
             <a:spLocks noGrp="1"/>
           </p:cNvSpPr>
           <p:nvPr>
-            <p:ph type="subTitle"/>
-          </p:nvPr>
-        </p:nvSpPr>
-        <p:spPr>
-          <a:xfrm>
-            <a:off x="838080" y="1825560"/>
-            <a:ext cx="10514880" cy="4350600"/>
-          </a:xfrm>
-          <a:prstGeom prst="rect">
-            <a:avLst/>
-          </a:prstGeom>
-        </p:spPr>
-        <p:txBody>
-          <a:bodyPr lIns="0" rIns="0" tIns="0" bIns="0" anchor="ctr"/>
-          <a:p>
-            <a:pPr algn="ctr"/>
-            <a:endParaRPr/>
-          </a:p>
-        </p:txBody>
-      </p:sp>
-      <p:sp>
-        <p:nvSpPr>
-          <p:cNvPr id="2" name="PlaceHolder 3"/>
-          <p:cNvSpPr>
-            <a:spLocks noGrp="1"/>
-          </p:cNvSpPr>
-          <p:nvPr>
             <p:ph type="body"/>
           </p:nvPr>
         </p:nvSpPr>
         <p:spPr>
           <a:xfrm>
             <a:off x="609480" y="1604520"/>
-            <a:ext cx="10972440" cy="3977280"/>
+            <a:ext cx="10972080" cy="3976920"/>
           </a:xfrm>
           <a:prstGeom prst="rect">
             <a:avLst/>
@@ -2716,7 +2689,7 @@
               <a:buChar char=""/>
             </a:pPr>
             <a:r>
-              <a:rPr lang="es-MX" sz="3200">
+              <a:rPr lang="es-MX">
                 <a:latin typeface="Arial"/>
               </a:rPr>
               <a:t>Pulse para editar el formato de esquema del texto</a:t>
@@ -2730,7 +2703,7 @@
               <a:buChar char=""/>
             </a:pPr>
             <a:r>
-              <a:rPr lang="es-MX" sz="2800">
+              <a:rPr lang="es-MX">
                 <a:latin typeface="Arial"/>
               </a:rPr>
               <a:t>Segundo nivel del esquema</a:t>
@@ -2744,7 +2717,7 @@
               <a:buChar char=""/>
             </a:pPr>
             <a:r>
-              <a:rPr lang="es-MX" sz="2400">
+              <a:rPr lang="es-MX">
                 <a:latin typeface="Arial"/>
               </a:rPr>
               <a:t>Tercer nivel del esquema</a:t>
@@ -2758,7 +2731,7 @@
               <a:buChar char=""/>
             </a:pPr>
             <a:r>
-              <a:rPr lang="es-MX" sz="2000">
+              <a:rPr lang="es-MX">
                 <a:latin typeface="Arial"/>
               </a:rPr>
               <a:t>Cuarto nivel del esquema</a:t>
@@ -2772,7 +2745,7 @@
               <a:buChar char=""/>
             </a:pPr>
             <a:r>
-              <a:rPr lang="es-MX" sz="2000">
+              <a:rPr lang="es-MX">
                 <a:latin typeface="Arial"/>
               </a:rPr>
               <a:t>Quinto nivel del esquema</a:t>
@@ -2786,7 +2759,7 @@
               <a:buChar char=""/>
             </a:pPr>
             <a:r>
-              <a:rPr lang="es-MX" sz="2000">
+              <a:rPr lang="es-MX">
                 <a:latin typeface="Arial"/>
               </a:rPr>
               <a:t>Sexto nivel del esquema</a:t>
@@ -2800,7 +2773,7 @@
               <a:buChar char=""/>
             </a:pPr>
             <a:r>
-              <a:rPr lang="es-MX" sz="2000">
+              <a:rPr lang="es-MX">
                 <a:latin typeface="Arial"/>
               </a:rPr>
               <a:t>Séptimo nivel del esquema</a:t>
@@ -2855,7 +2828,7 @@
       </p:grpSpPr>
       <p:sp>
         <p:nvSpPr>
-          <p:cNvPr id="37" name="PlaceHolder 1"/>
+          <p:cNvPr id="36" name="PlaceHolder 1"/>
           <p:cNvSpPr>
             <a:spLocks noGrp="1"/>
           </p:cNvSpPr>
@@ -2888,7 +2861,7 @@
       </p:sp>
       <p:sp>
         <p:nvSpPr>
-          <p:cNvPr id="38" name="PlaceHolder 2"/>
+          <p:cNvPr id="37" name="PlaceHolder 2"/>
           <p:cNvSpPr>
             <a:spLocks noGrp="1"/>
           </p:cNvSpPr>
@@ -3046,14 +3019,14 @@
       </p:grpSpPr>
       <p:sp>
         <p:nvSpPr>
-          <p:cNvPr id="78" name="CustomShape 1"/>
+          <p:cNvPr id="77" name="CustomShape 1"/>
           <p:cNvSpPr/>
           <p:nvPr/>
         </p:nvSpPr>
         <p:spPr>
           <a:xfrm>
             <a:off x="1523880" y="1122480"/>
-            <a:ext cx="9143280" cy="2386800"/>
+            <a:ext cx="9142920" cy="2386440"/>
           </a:xfrm>
           <a:prstGeom prst="rect">
             <a:avLst/>
@@ -3078,6 +3051,7 @@
                   <a:srgbClr val="000000"/>
                 </a:solidFill>
                 <a:latin typeface="Arial Narrow"/>
+                <a:ea typeface="DejaVu Sans"/>
               </a:rPr>
               <a:t>Reunión Kick off Viáticos</a:t>
             </a:r>
@@ -3098,14 +3072,14 @@
       </p:sp>
       <p:sp>
         <p:nvSpPr>
-          <p:cNvPr id="79" name="CustomShape 2"/>
+          <p:cNvPr id="78" name="CustomShape 2"/>
           <p:cNvSpPr/>
           <p:nvPr/>
         </p:nvSpPr>
         <p:spPr>
           <a:xfrm>
             <a:off x="1523880" y="3602160"/>
-            <a:ext cx="9143280" cy="1654920"/>
+            <a:ext cx="9142920" cy="1654560"/>
           </a:xfrm>
           <a:prstGeom prst="rect">
             <a:avLst/>
@@ -3124,7 +3098,7 @@
       </p:sp>
       <p:pic>
         <p:nvPicPr>
-          <p:cNvPr id="80" name="5 Imagen" descr=""/>
+          <p:cNvPr id="79" name="5 Imagen" descr=""/>
           <p:cNvPicPr/>
           <p:nvPr/>
         </p:nvPicPr>
@@ -3135,7 +3109,7 @@
         <p:spPr>
           <a:xfrm>
             <a:off x="8373960" y="5486400"/>
-            <a:ext cx="3817440" cy="1370880"/>
+            <a:ext cx="3817080" cy="1370520"/>
           </a:xfrm>
           <a:prstGeom prst="rect">
             <a:avLst/>
@@ -3196,14 +3170,14 @@
       </p:grpSpPr>
       <p:sp>
         <p:nvSpPr>
-          <p:cNvPr id="81" name="CustomShape 1"/>
+          <p:cNvPr id="80" name="CustomShape 1"/>
           <p:cNvSpPr/>
           <p:nvPr/>
         </p:nvSpPr>
         <p:spPr>
           <a:xfrm>
             <a:off x="838080" y="365040"/>
-            <a:ext cx="10514880" cy="1324800"/>
+            <a:ext cx="10514520" cy="1324440"/>
           </a:xfrm>
           <a:prstGeom prst="rect">
             <a:avLst/>
@@ -3233,6 +3207,7 @@
                   <a:srgbClr val="ff9900"/>
                 </a:solidFill>
                 <a:latin typeface="Arial Narrow"/>
+                <a:ea typeface="DejaVu Sans"/>
               </a:rPr>
               <a:t>Objetivo de la reunión </a:t>
             </a:r>
@@ -3242,14 +3217,14 @@
       </p:sp>
       <p:sp>
         <p:nvSpPr>
-          <p:cNvPr id="82" name="CustomShape 2"/>
+          <p:cNvPr id="81" name="CustomShape 2"/>
           <p:cNvSpPr/>
           <p:nvPr/>
         </p:nvSpPr>
         <p:spPr>
           <a:xfrm>
             <a:off x="838080" y="1825560"/>
-            <a:ext cx="10514880" cy="4350600"/>
+            <a:ext cx="10514520" cy="4350240"/>
           </a:xfrm>
           <a:prstGeom prst="rect">
             <a:avLst/>
@@ -3281,6 +3256,7 @@
                   <a:srgbClr val="000000"/>
                 </a:solidFill>
                 <a:latin typeface="Arial Narrow"/>
+                <a:ea typeface="DejaVu Sans"/>
               </a:rPr>
               <a:t>Alcance del proyecto.</a:t>
             </a:r>
@@ -3300,6 +3276,7 @@
                   <a:srgbClr val="000000"/>
                 </a:solidFill>
                 <a:latin typeface="Arial Narrow"/>
+                <a:ea typeface="DejaVu Sans"/>
               </a:rPr>
               <a:t>Hitos </a:t>
             </a:r>
@@ -3319,6 +3296,7 @@
                   <a:srgbClr val="000000"/>
                 </a:solidFill>
                 <a:latin typeface="Arial Narrow"/>
+                <a:ea typeface="DejaVu Sans"/>
               </a:rPr>
               <a:t>Involucrados</a:t>
             </a:r>
@@ -3338,6 +3316,7 @@
                   <a:srgbClr val="000000"/>
                 </a:solidFill>
                 <a:latin typeface="Arial Narrow"/>
+                <a:ea typeface="DejaVu Sans"/>
               </a:rPr>
               <a:t>Riesgos</a:t>
             </a:r>
@@ -3355,7 +3334,7 @@
       </p:sp>
       <p:pic>
         <p:nvPicPr>
-          <p:cNvPr id="83" name="4 Imagen" descr=""/>
+          <p:cNvPr id="82" name="4 Imagen" descr=""/>
           <p:cNvPicPr/>
           <p:nvPr/>
         </p:nvPicPr>
@@ -3366,7 +3345,7 @@
         <p:spPr>
           <a:xfrm>
             <a:off x="8373960" y="5486400"/>
-            <a:ext cx="3817440" cy="1370880"/>
+            <a:ext cx="3817080" cy="1370520"/>
           </a:xfrm>
           <a:prstGeom prst="rect">
             <a:avLst/>
@@ -3427,14 +3406,14 @@
       </p:grpSpPr>
       <p:sp>
         <p:nvSpPr>
-          <p:cNvPr id="84" name="CustomShape 1"/>
+          <p:cNvPr id="83" name="CustomShape 1"/>
           <p:cNvSpPr/>
           <p:nvPr/>
         </p:nvSpPr>
         <p:spPr>
           <a:xfrm>
             <a:off x="838080" y="365040"/>
-            <a:ext cx="10514880" cy="1324800"/>
+            <a:ext cx="10514520" cy="1324440"/>
           </a:xfrm>
           <a:prstGeom prst="rect">
             <a:avLst/>
@@ -3464,6 +3443,7 @@
                   <a:srgbClr val="ff9900"/>
                 </a:solidFill>
                 <a:latin typeface="Arial Narrow"/>
+                <a:ea typeface="DejaVu Sans"/>
               </a:rPr>
               <a:t>Alcance del proyecto</a:t>
             </a:r>
@@ -3473,14 +3453,14 @@
       </p:sp>
       <p:sp>
         <p:nvSpPr>
-          <p:cNvPr id="85" name="CustomShape 2"/>
+          <p:cNvPr id="84" name="CustomShape 2"/>
           <p:cNvSpPr/>
           <p:nvPr/>
         </p:nvSpPr>
         <p:spPr>
           <a:xfrm>
             <a:off x="838080" y="1825560"/>
-            <a:ext cx="10514880" cy="4350600"/>
+            <a:ext cx="10514520" cy="4350240"/>
           </a:xfrm>
           <a:prstGeom prst="rect">
             <a:avLst/>
@@ -3512,6 +3492,7 @@
                   <a:srgbClr val="000000"/>
                 </a:solidFill>
                 <a:latin typeface="Arial Narrow"/>
+                <a:ea typeface="DejaVu Sans"/>
               </a:rPr>
               <a:t>Resolver las necesidades del cliente expresadas en el documento requerimientos del proyecto.</a:t>
             </a:r>
@@ -3531,6 +3512,7 @@
                   <a:srgbClr val="000000"/>
                 </a:solidFill>
                 <a:latin typeface="Arial Narrow"/>
+                <a:ea typeface="DejaVu Sans"/>
               </a:rPr>
               <a:t>Solución:</a:t>
             </a:r>
@@ -3550,6 +3532,7 @@
                   <a:srgbClr val="000000"/>
                 </a:solidFill>
                 <a:latin typeface="Arial Narrow"/>
+                <a:ea typeface="DejaVu Sans"/>
               </a:rPr>
               <a:t>Sistema web</a:t>
             </a:r>
@@ -3559,7 +3542,7 @@
       </p:sp>
       <p:pic>
         <p:nvPicPr>
-          <p:cNvPr id="86" name="4 Imagen" descr=""/>
+          <p:cNvPr id="85" name="4 Imagen" descr=""/>
           <p:cNvPicPr/>
           <p:nvPr/>
         </p:nvPicPr>
@@ -3570,7 +3553,7 @@
         <p:spPr>
           <a:xfrm>
             <a:off x="8373960" y="5486400"/>
-            <a:ext cx="3817440" cy="1370880"/>
+            <a:ext cx="3817080" cy="1370520"/>
           </a:xfrm>
           <a:prstGeom prst="rect">
             <a:avLst/>
@@ -3631,14 +3614,14 @@
       </p:grpSpPr>
       <p:sp>
         <p:nvSpPr>
-          <p:cNvPr id="87" name="CustomShape 1"/>
+          <p:cNvPr id="86" name="CustomShape 1"/>
           <p:cNvSpPr/>
           <p:nvPr/>
         </p:nvSpPr>
         <p:spPr>
           <a:xfrm>
             <a:off x="838080" y="365040"/>
-            <a:ext cx="10514880" cy="1324800"/>
+            <a:ext cx="10514520" cy="1324440"/>
           </a:xfrm>
           <a:prstGeom prst="rect">
             <a:avLst/>
@@ -3668,6 +3651,7 @@
                   <a:srgbClr val="ff9900"/>
                 </a:solidFill>
                 <a:latin typeface="Arial Narrow"/>
+                <a:ea typeface="DejaVu Sans"/>
               </a:rPr>
               <a:t>Alcance del proyecto (entregables)</a:t>
             </a:r>
@@ -3677,14 +3661,14 @@
       </p:sp>
       <p:sp>
         <p:nvSpPr>
-          <p:cNvPr id="88" name="CustomShape 2"/>
+          <p:cNvPr id="87" name="CustomShape 2"/>
           <p:cNvSpPr/>
           <p:nvPr/>
         </p:nvSpPr>
         <p:spPr>
           <a:xfrm>
             <a:off x="838080" y="1825560"/>
-            <a:ext cx="10514880" cy="4350600"/>
+            <a:ext cx="10514520" cy="4350240"/>
           </a:xfrm>
           <a:prstGeom prst="rect">
             <a:avLst/>
@@ -3704,11 +3688,9 @@
           <a:bodyPr lIns="90000" rIns="90000" tIns="45000" bIns="45000"/>
           <a:p>
             <a:pPr>
-              <a:lnSpc>
-                <a:spcPct val="100000"/>
-              </a:lnSpc>
-              <a:buFont typeface="Calibri Light"/>
-              <a:buAutoNum type="arabicPeriod"/>
+              <a:buSzPct val="45000"/>
+              <a:buFont typeface="StarSymbol"/>
+              <a:buChar char=""/>
             </a:pPr>
             <a:r>
               <a:rPr lang="es-MX" sz="2800" strike="noStrike">
@@ -3716,18 +3698,17 @@
                   <a:srgbClr val="000000"/>
                 </a:solidFill>
                 <a:latin typeface="Arial Narrow"/>
+                <a:ea typeface="DejaVu Sans"/>
               </a:rPr>
-              <a:t>Manual de usuario.</a:t>
+              <a:t>Manual de usuario</a:t>
             </a:r>
             <a:endParaRPr/>
           </a:p>
           <a:p>
             <a:pPr>
-              <a:lnSpc>
-                <a:spcPct val="100000"/>
-              </a:lnSpc>
-              <a:buFont typeface="Calibri Light"/>
-              <a:buAutoNum type="arabicPeriod"/>
+              <a:buSzPct val="45000"/>
+              <a:buFont typeface="StarSymbol"/>
+              <a:buChar char=""/>
             </a:pPr>
             <a:r>
               <a:rPr lang="es-MX" sz="2800" strike="noStrike">
@@ -3735,27 +3716,9 @@
                   <a:srgbClr val="000000"/>
                 </a:solidFill>
                 <a:latin typeface="Arial Narrow"/>
+                <a:ea typeface="DejaVu Sans"/>
               </a:rPr>
-              <a:t>Sitio web funcional.</a:t>
-            </a:r>
-            <a:endParaRPr/>
-          </a:p>
-          <a:p>
-            <a:pPr>
-              <a:lnSpc>
-                <a:spcPct val="100000"/>
-              </a:lnSpc>
-              <a:buFont typeface="Calibri Light"/>
-              <a:buAutoNum type="arabicPeriod"/>
-            </a:pPr>
-            <a:r>
-              <a:rPr lang="es-MX" sz="2800" strike="noStrike">
-                <a:solidFill>
-                  <a:srgbClr val="000000"/>
-                </a:solidFill>
-                <a:latin typeface="Arial Narrow"/>
-              </a:rPr>
-              <a:t>Código fuente.</a:t>
+              <a:t>Software implementado</a:t>
             </a:r>
             <a:endParaRPr/>
           </a:p>
@@ -3771,7 +3734,7 @@
       </p:sp>
       <p:pic>
         <p:nvPicPr>
-          <p:cNvPr id="89" name="4 Imagen" descr=""/>
+          <p:cNvPr id="88" name="4 Imagen" descr=""/>
           <p:cNvPicPr/>
           <p:nvPr/>
         </p:nvPicPr>
@@ -3782,7 +3745,7 @@
         <p:spPr>
           <a:xfrm>
             <a:off x="8373960" y="5486400"/>
-            <a:ext cx="3817440" cy="1370880"/>
+            <a:ext cx="3817080" cy="1370520"/>
           </a:xfrm>
           <a:prstGeom prst="rect">
             <a:avLst/>
@@ -3843,14 +3806,14 @@
       </p:grpSpPr>
       <p:sp>
         <p:nvSpPr>
-          <p:cNvPr id="90" name="CustomShape 1"/>
+          <p:cNvPr id="89" name="CustomShape 1"/>
           <p:cNvSpPr/>
           <p:nvPr/>
         </p:nvSpPr>
         <p:spPr>
           <a:xfrm>
             <a:off x="838080" y="365040"/>
-            <a:ext cx="10514880" cy="1324800"/>
+            <a:ext cx="10514520" cy="1324440"/>
           </a:xfrm>
           <a:prstGeom prst="rect">
             <a:avLst/>
@@ -3880,6 +3843,7 @@
                   <a:srgbClr val="ff9900"/>
                 </a:solidFill>
                 <a:latin typeface="Arial Narrow"/>
+                <a:ea typeface="DejaVu Sans"/>
               </a:rPr>
               <a:t>Hitos</a:t>
             </a:r>
@@ -3889,7 +3853,7 @@
       </p:sp>
       <p:graphicFrame>
         <p:nvGraphicFramePr>
-          <p:cNvPr id="91" name="Table 2"/>
+          <p:cNvPr id="90" name="Table 2"/>
           <p:cNvGraphicFramePr/>
           <p:nvPr/>
         </p:nvGraphicFramePr>
@@ -4147,14 +4111,14 @@
       </p:graphicFrame>
       <p:sp>
         <p:nvSpPr>
-          <p:cNvPr id="92" name="CustomShape 3"/>
+          <p:cNvPr id="91" name="CustomShape 3"/>
           <p:cNvSpPr/>
           <p:nvPr/>
         </p:nvSpPr>
         <p:spPr>
           <a:xfrm>
             <a:off x="4699080" y="2381040"/>
-            <a:ext cx="183960" cy="368640"/>
+            <a:ext cx="183600" cy="368280"/>
           </a:xfrm>
           <a:prstGeom prst="rect">
             <a:avLst/>
@@ -4173,7 +4137,7 @@
       </p:sp>
       <p:pic>
         <p:nvPicPr>
-          <p:cNvPr id="93" name="6 Imagen" descr=""/>
+          <p:cNvPr id="92" name="6 Imagen" descr=""/>
           <p:cNvPicPr/>
           <p:nvPr/>
         </p:nvPicPr>
@@ -4184,7 +4148,7 @@
         <p:spPr>
           <a:xfrm>
             <a:off x="8373960" y="5486400"/>
-            <a:ext cx="3817440" cy="1370880"/>
+            <a:ext cx="3817080" cy="1370520"/>
           </a:xfrm>
           <a:prstGeom prst="rect">
             <a:avLst/>
@@ -4245,7 +4209,7 @@
       </p:grpSpPr>
       <p:pic>
         <p:nvPicPr>
-          <p:cNvPr id="94" name="5 Imagen" descr=""/>
+          <p:cNvPr id="93" name="5 Imagen" descr=""/>
           <p:cNvPicPr/>
           <p:nvPr/>
         </p:nvPicPr>
@@ -4256,7 +4220,7 @@
         <p:spPr>
           <a:xfrm>
             <a:off x="8373960" y="5486400"/>
-            <a:ext cx="3817440" cy="1370880"/>
+            <a:ext cx="3817080" cy="1370520"/>
           </a:xfrm>
           <a:prstGeom prst="rect">
             <a:avLst/>
@@ -4268,14 +4232,14 @@
       </p:pic>
       <p:sp>
         <p:nvSpPr>
-          <p:cNvPr id="95" name="CustomShape 1"/>
+          <p:cNvPr id="94" name="CustomShape 1"/>
           <p:cNvSpPr/>
           <p:nvPr/>
         </p:nvSpPr>
         <p:spPr>
           <a:xfrm>
             <a:off x="1891800" y="378720"/>
-            <a:ext cx="8308080" cy="761040"/>
+            <a:ext cx="8307720" cy="760680"/>
           </a:xfrm>
           <a:prstGeom prst="rect">
             <a:avLst/>
@@ -4305,6 +4269,7 @@
                   <a:srgbClr val="ff9900"/>
                 </a:solidFill>
                 <a:latin typeface="Arial Narrow"/>
+                <a:ea typeface="DejaVu Sans"/>
               </a:rPr>
               <a:t>Personas Involucradas</a:t>
             </a:r>
@@ -4314,14 +4279,14 @@
       </p:sp>
       <p:sp>
         <p:nvSpPr>
-          <p:cNvPr id="96" name="CustomShape 2"/>
+          <p:cNvPr id="95" name="CustomShape 2"/>
           <p:cNvSpPr/>
           <p:nvPr/>
         </p:nvSpPr>
         <p:spPr>
           <a:xfrm>
             <a:off x="5893200" y="3576240"/>
-            <a:ext cx="3303360" cy="934920"/>
+            <a:ext cx="3303000" cy="934560"/>
           </a:xfrm>
           <a:custGeom>
             <a:avLst/>
@@ -4368,14 +4333,14 @@
       </p:sp>
       <p:sp>
         <p:nvSpPr>
-          <p:cNvPr id="97" name="CustomShape 3"/>
+          <p:cNvPr id="96" name="CustomShape 3"/>
           <p:cNvSpPr/>
           <p:nvPr/>
         </p:nvSpPr>
         <p:spPr>
           <a:xfrm>
             <a:off x="5893200" y="3576240"/>
-            <a:ext cx="1094400" cy="933840"/>
+            <a:ext cx="1094040" cy="933480"/>
           </a:xfrm>
           <a:custGeom>
             <a:avLst/>
@@ -4422,14 +4387,14 @@
       </p:sp>
       <p:sp>
         <p:nvSpPr>
-          <p:cNvPr id="98" name="CustomShape 4"/>
+          <p:cNvPr id="97" name="CustomShape 4"/>
           <p:cNvSpPr/>
           <p:nvPr/>
         </p:nvSpPr>
         <p:spPr>
           <a:xfrm>
             <a:off x="4853160" y="3576240"/>
-            <a:ext cx="1039320" cy="933840"/>
+            <a:ext cx="1038960" cy="933480"/>
           </a:xfrm>
           <a:custGeom>
             <a:avLst/>
@@ -4476,14 +4441,14 @@
       </p:sp>
       <p:sp>
         <p:nvSpPr>
-          <p:cNvPr id="99" name="CustomShape 5"/>
+          <p:cNvPr id="98" name="CustomShape 5"/>
           <p:cNvSpPr/>
           <p:nvPr/>
         </p:nvSpPr>
         <p:spPr>
           <a:xfrm>
             <a:off x="2718000" y="3576240"/>
-            <a:ext cx="3174480" cy="933840"/>
+            <a:ext cx="3174120" cy="933480"/>
           </a:xfrm>
           <a:custGeom>
             <a:avLst/>
@@ -4530,14 +4495,14 @@
       </p:sp>
       <p:sp>
         <p:nvSpPr>
-          <p:cNvPr id="100" name="CustomShape 6"/>
+          <p:cNvPr id="99" name="CustomShape 6"/>
           <p:cNvSpPr/>
           <p:nvPr/>
         </p:nvSpPr>
         <p:spPr>
           <a:xfrm>
             <a:off x="5847480" y="2125800"/>
-            <a:ext cx="90720" cy="582480"/>
+            <a:ext cx="90360" cy="582120"/>
           </a:xfrm>
           <a:custGeom>
             <a:avLst/>
@@ -4584,18 +4549,18 @@
       </p:sp>
       <p:sp>
         <p:nvSpPr>
-          <p:cNvPr id="101" name="CustomShape 7"/>
+          <p:cNvPr id="100" name="CustomShape 7"/>
           <p:cNvSpPr/>
           <p:nvPr/>
         </p:nvSpPr>
         <p:spPr>
           <a:xfrm>
             <a:off x="4042800" y="1195920"/>
-            <a:ext cx="3700080" cy="929160"/>
+            <a:ext cx="3699720" cy="928800"/>
           </a:xfrm>
           <a:prstGeom prst="roundRect">
             <a:avLst>
-              <a:gd name="adj" fmla="val 13599"/>
+              <a:gd name="adj" fmla="val 13737"/>
             </a:avLst>
           </a:prstGeom>
           <a:solidFill>
@@ -4630,18 +4595,18 @@
       </p:sp>
       <p:sp>
         <p:nvSpPr>
-          <p:cNvPr id="102" name="CustomShape 8"/>
+          <p:cNvPr id="101" name="CustomShape 8"/>
           <p:cNvSpPr/>
           <p:nvPr/>
         </p:nvSpPr>
         <p:spPr>
           <a:xfrm>
             <a:off x="4287960" y="1428840"/>
-            <a:ext cx="3700080" cy="929160"/>
+            <a:ext cx="3699720" cy="928800"/>
           </a:xfrm>
           <a:prstGeom prst="roundRect">
             <a:avLst>
-              <a:gd name="adj" fmla="val 13599"/>
+              <a:gd name="adj" fmla="val 13737"/>
             </a:avLst>
           </a:prstGeom>
           <a:solidFill>
@@ -4690,18 +4655,18 @@
       </p:sp>
       <p:sp>
         <p:nvSpPr>
-          <p:cNvPr id="103" name="CustomShape 9"/>
+          <p:cNvPr id="102" name="CustomShape 9"/>
           <p:cNvSpPr/>
           <p:nvPr/>
         </p:nvSpPr>
         <p:spPr>
           <a:xfrm>
             <a:off x="4590000" y="2709000"/>
-            <a:ext cx="2606040" cy="866520"/>
+            <a:ext cx="2605680" cy="866160"/>
           </a:xfrm>
           <a:prstGeom prst="roundRect">
             <a:avLst>
-              <a:gd name="adj" fmla="val 13599"/>
+              <a:gd name="adj" fmla="val 13737"/>
             </a:avLst>
           </a:prstGeom>
           <a:gradFill>
@@ -4759,18 +4724,18 @@
       </p:sp>
       <p:sp>
         <p:nvSpPr>
-          <p:cNvPr id="104" name="CustomShape 10"/>
+          <p:cNvPr id="103" name="CustomShape 10"/>
           <p:cNvSpPr/>
           <p:nvPr/>
         </p:nvSpPr>
         <p:spPr>
           <a:xfrm>
             <a:off x="4835160" y="2942280"/>
-            <a:ext cx="2606040" cy="866520"/>
+            <a:ext cx="2605680" cy="866160"/>
           </a:xfrm>
           <a:prstGeom prst="roundRect">
             <a:avLst>
-              <a:gd name="adj" fmla="val 13599"/>
+              <a:gd name="adj" fmla="val 13737"/>
             </a:avLst>
           </a:prstGeom>
           <a:solidFill>
@@ -4819,18 +4784,18 @@
       </p:sp>
       <p:sp>
         <p:nvSpPr>
-          <p:cNvPr id="105" name="CustomShape 11"/>
+          <p:cNvPr id="104" name="CustomShape 11"/>
           <p:cNvSpPr/>
           <p:nvPr/>
         </p:nvSpPr>
         <p:spPr>
           <a:xfrm>
             <a:off x="1895760" y="4510800"/>
-            <a:ext cx="1644120" cy="1009440"/>
+            <a:ext cx="1643760" cy="1009080"/>
           </a:xfrm>
           <a:prstGeom prst="roundRect">
             <a:avLst>
-              <a:gd name="adj" fmla="val 13599"/>
+              <a:gd name="adj" fmla="val 13737"/>
             </a:avLst>
           </a:prstGeom>
           <a:gradFill>
@@ -4888,18 +4853,18 @@
       </p:sp>
       <p:sp>
         <p:nvSpPr>
-          <p:cNvPr id="106" name="CustomShape 12"/>
+          <p:cNvPr id="105" name="CustomShape 12"/>
           <p:cNvSpPr/>
           <p:nvPr/>
         </p:nvSpPr>
         <p:spPr>
           <a:xfrm>
             <a:off x="2140920" y="4743720"/>
-            <a:ext cx="1644120" cy="1009440"/>
+            <a:ext cx="1643760" cy="1009080"/>
           </a:xfrm>
           <a:prstGeom prst="roundRect">
             <a:avLst>
-              <a:gd name="adj" fmla="val 13599"/>
+              <a:gd name="adj" fmla="val 13737"/>
             </a:avLst>
           </a:prstGeom>
           <a:solidFill>
@@ -4948,18 +4913,18 @@
       </p:sp>
       <p:sp>
         <p:nvSpPr>
-          <p:cNvPr id="107" name="CustomShape 13"/>
+          <p:cNvPr id="106" name="CustomShape 13"/>
           <p:cNvSpPr/>
           <p:nvPr/>
         </p:nvSpPr>
         <p:spPr>
           <a:xfrm>
             <a:off x="4030920" y="4510800"/>
-            <a:ext cx="1644120" cy="1009440"/>
+            <a:ext cx="1643760" cy="1009080"/>
           </a:xfrm>
           <a:prstGeom prst="roundRect">
             <a:avLst>
-              <a:gd name="adj" fmla="val 13599"/>
+              <a:gd name="adj" fmla="val 13737"/>
             </a:avLst>
           </a:prstGeom>
           <a:gradFill>
@@ -5017,18 +4982,18 @@
       </p:sp>
       <p:sp>
         <p:nvSpPr>
-          <p:cNvPr id="108" name="CustomShape 14"/>
+          <p:cNvPr id="107" name="CustomShape 14"/>
           <p:cNvSpPr/>
           <p:nvPr/>
         </p:nvSpPr>
         <p:spPr>
           <a:xfrm>
             <a:off x="4276080" y="4743720"/>
-            <a:ext cx="1644120" cy="1009440"/>
+            <a:ext cx="1643760" cy="1009080"/>
           </a:xfrm>
           <a:prstGeom prst="roundRect">
             <a:avLst>
-              <a:gd name="adj" fmla="val 13599"/>
+              <a:gd name="adj" fmla="val 13737"/>
             </a:avLst>
           </a:prstGeom>
           <a:solidFill>
@@ -5077,18 +5042,18 @@
       </p:sp>
       <p:sp>
         <p:nvSpPr>
-          <p:cNvPr id="109" name="CustomShape 15"/>
+          <p:cNvPr id="108" name="CustomShape 15"/>
           <p:cNvSpPr/>
           <p:nvPr/>
         </p:nvSpPr>
         <p:spPr>
           <a:xfrm>
             <a:off x="6166080" y="4510800"/>
-            <a:ext cx="1644120" cy="1009440"/>
+            <a:ext cx="1643760" cy="1009080"/>
           </a:xfrm>
           <a:prstGeom prst="roundRect">
             <a:avLst>
-              <a:gd name="adj" fmla="val 13599"/>
+              <a:gd name="adj" fmla="val 13737"/>
             </a:avLst>
           </a:prstGeom>
           <a:gradFill>
@@ -5146,18 +5111,18 @@
       </p:sp>
       <p:sp>
         <p:nvSpPr>
-          <p:cNvPr id="110" name="CustomShape 16"/>
+          <p:cNvPr id="109" name="CustomShape 16"/>
           <p:cNvSpPr/>
           <p:nvPr/>
         </p:nvSpPr>
         <p:spPr>
           <a:xfrm>
             <a:off x="6411240" y="4743720"/>
-            <a:ext cx="1644120" cy="1009440"/>
+            <a:ext cx="1643760" cy="1009080"/>
           </a:xfrm>
           <a:prstGeom prst="roundRect">
             <a:avLst>
-              <a:gd name="adj" fmla="val 13599"/>
+              <a:gd name="adj" fmla="val 13737"/>
             </a:avLst>
           </a:prstGeom>
           <a:solidFill>
@@ -5206,18 +5171,18 @@
       </p:sp>
       <p:sp>
         <p:nvSpPr>
-          <p:cNvPr id="111" name="CustomShape 17"/>
+          <p:cNvPr id="110" name="CustomShape 17"/>
           <p:cNvSpPr/>
           <p:nvPr/>
         </p:nvSpPr>
         <p:spPr>
           <a:xfrm>
             <a:off x="8375040" y="4511880"/>
-            <a:ext cx="1644120" cy="1009440"/>
+            <a:ext cx="1643760" cy="1009080"/>
           </a:xfrm>
           <a:prstGeom prst="roundRect">
             <a:avLst>
-              <a:gd name="adj" fmla="val 13599"/>
+              <a:gd name="adj" fmla="val 13737"/>
             </a:avLst>
           </a:prstGeom>
           <a:gradFill>
@@ -5275,18 +5240,18 @@
       </p:sp>
       <p:sp>
         <p:nvSpPr>
-          <p:cNvPr id="112" name="CustomShape 18"/>
+          <p:cNvPr id="111" name="CustomShape 18"/>
           <p:cNvSpPr/>
           <p:nvPr/>
         </p:nvSpPr>
         <p:spPr>
           <a:xfrm>
             <a:off x="8620200" y="4744800"/>
-            <a:ext cx="1644120" cy="1009440"/>
+            <a:ext cx="1643760" cy="1009080"/>
           </a:xfrm>
           <a:prstGeom prst="roundRect">
             <a:avLst>
-              <a:gd name="adj" fmla="val 13599"/>
+              <a:gd name="adj" fmla="val 13737"/>
             </a:avLst>
           </a:prstGeom>
           <a:solidFill>
@@ -5384,14 +5349,14 @@
       </p:grpSpPr>
       <p:sp>
         <p:nvSpPr>
-          <p:cNvPr id="113" name="CustomShape 1"/>
+          <p:cNvPr id="112" name="CustomShape 1"/>
           <p:cNvSpPr/>
           <p:nvPr/>
         </p:nvSpPr>
         <p:spPr>
           <a:xfrm>
             <a:off x="838080" y="365040"/>
-            <a:ext cx="10514880" cy="1324800"/>
+            <a:ext cx="10514520" cy="1324440"/>
           </a:xfrm>
           <a:prstGeom prst="rect">
             <a:avLst/>
@@ -5421,6 +5386,7 @@
                   <a:srgbClr val="ff9900"/>
                 </a:solidFill>
                 <a:latin typeface="Arial Narrow"/>
+                <a:ea typeface="DejaVu Sans"/>
               </a:rPr>
               <a:t>Riesgos</a:t>
             </a:r>
@@ -5430,14 +5396,14 @@
       </p:sp>
       <p:sp>
         <p:nvSpPr>
-          <p:cNvPr id="114" name="CustomShape 2"/>
+          <p:cNvPr id="113" name="CustomShape 2"/>
           <p:cNvSpPr/>
           <p:nvPr/>
         </p:nvSpPr>
         <p:spPr>
           <a:xfrm>
             <a:off x="838080" y="1825560"/>
-            <a:ext cx="10514880" cy="4350600"/>
+            <a:ext cx="10514520" cy="4350240"/>
           </a:xfrm>
           <a:prstGeom prst="rect">
             <a:avLst/>
@@ -5467,6 +5433,7 @@
                   <a:srgbClr val="000000"/>
                 </a:solidFill>
                 <a:latin typeface="Arial Narrow"/>
+                <a:ea typeface="DejaVu Sans"/>
               </a:rPr>
               <a:t>Riesgos principales</a:t>
             </a:r>
@@ -5485,6 +5452,8 @@
               <a:lnSpc>
                 <a:spcPct val="90000"/>
               </a:lnSpc>
+              <a:buFont typeface="StarSymbol"/>
+              <a:buChar char=""/>
             </a:pPr>
             <a:r>
               <a:rPr lang="es-MX" sz="2400" strike="noStrike">
@@ -5494,7 +5463,7 @@
                 <a:latin typeface="Calibri"/>
                 <a:ea typeface="DejaVu Sans"/>
               </a:rPr>
-              <a:t>Obtener un gasto mayor del proyecto a causa de utilizar mas tiempo en las actividades de planeación o desarrollo ocasionando perdidas en la empresa</a:t>
+              <a:t>Obtener un gasto mayor del proyecto a causa de utilizar mas tiempo en las actividades de planeación o desarrollo ocasionando perdidas en la empresa.</a:t>
             </a:r>
             <a:endParaRPr/>
           </a:p>
@@ -5503,6 +5472,8 @@
               <a:lnSpc>
                 <a:spcPct val="90000"/>
               </a:lnSpc>
+              <a:buFont typeface="StarSymbol"/>
+              <a:buChar char=""/>
             </a:pPr>
             <a:r>
               <a:rPr lang="es-MX" sz="2400" strike="noStrike">
@@ -5521,6 +5492,8 @@
               <a:lnSpc>
                 <a:spcPct val="90000"/>
               </a:lnSpc>
+              <a:buFont typeface="StarSymbol"/>
+              <a:buChar char=""/>
             </a:pPr>
             <a:r>
               <a:rPr lang="es-MX" sz="2400" strike="noStrike">
@@ -5539,6 +5512,8 @@
               <a:lnSpc>
                 <a:spcPct val="90000"/>
               </a:lnSpc>
+              <a:buFont typeface="StarSymbol"/>
+              <a:buChar char=""/>
             </a:pPr>
             <a:r>
               <a:rPr lang="es-MX" sz="2400" strike="noStrike">
@@ -5557,6 +5532,8 @@
               <a:lnSpc>
                 <a:spcPct val="90000"/>
               </a:lnSpc>
+              <a:buFont typeface="StarSymbol"/>
+              <a:buChar char=""/>
             </a:pPr>
             <a:r>
               <a:rPr lang="es-MX" sz="2400" strike="noStrike">
@@ -5622,7 +5599,7 @@
       </p:sp>
       <p:pic>
         <p:nvPicPr>
-          <p:cNvPr id="115" name="4 Imagen" descr=""/>
+          <p:cNvPr id="114" name="4 Imagen" descr=""/>
           <p:cNvPicPr/>
           <p:nvPr/>
         </p:nvPicPr>
@@ -5633,7 +5610,7 @@
         <p:spPr>
           <a:xfrm>
             <a:off x="8524080" y="5594760"/>
-            <a:ext cx="3667320" cy="1262520"/>
+            <a:ext cx="3666960" cy="1262160"/>
           </a:xfrm>
           <a:prstGeom prst="rect">
             <a:avLst/>

</xml_diff>

<commit_message>
actualización de fechas trasentrega de proyecto
</commit_message>
<xml_diff>
--- a/Proyectos/Viaticos/02. Planeación/Viaticos-KickOff.pptx
+++ b/Proyectos/Viaticos/02. Planeación/Viaticos-KickOff.pptx
@@ -191,7 +191,7 @@
           <a:bodyPr lIns="0" rIns="0" tIns="0" bIns="0" anchor="b"/>
           <a:p>
             <a:pPr algn="r"/>
-            <a:fld id="{9ACD5956-06EB-4EA3-A399-9BF70607AD36}" type="slidenum">
+            <a:fld id="{E8923451-05D9-499D-B2AE-98EF387A864F}" type="slidenum">
               <a:rPr lang="es-MX" sz="1400">
                 <a:latin typeface="Times New Roman"/>
               </a:rPr>
@@ -237,7 +237,7 @@
         <p:spPr>
           <a:xfrm>
             <a:off x="685800" y="4343400"/>
-            <a:ext cx="5485320" cy="4113720"/>
+            <a:ext cx="5484960" cy="4113360"/>
           </a:xfrm>
           <a:prstGeom prst="rect">
             <a:avLst/>
@@ -259,7 +259,7 @@
         <p:spPr>
           <a:xfrm>
             <a:off x="3884760" y="8685360"/>
-            <a:ext cx="2970720" cy="456120"/>
+            <a:ext cx="2970360" cy="455760"/>
           </a:xfrm>
           <a:prstGeom prst="rect">
             <a:avLst/>
@@ -283,7 +283,7 @@
                 <a:spcPct val="100000"/>
               </a:lnSpc>
             </a:pPr>
-            <a:fld id="{44514A71-10E6-491C-8C69-75EFE1E7CEF5}" type="slidenum">
+            <a:fld id="{E26152B7-1E3D-489F-B623-CF888E88D4C2}" type="slidenum">
               <a:rPr lang="es-MX" sz="1200" strike="noStrike">
                 <a:solidFill>
                   <a:srgbClr val="000000"/>
@@ -2647,7 +2647,7 @@
         <p:spPr>
           <a:xfrm>
             <a:off x="609480" y="273600"/>
-            <a:ext cx="10972080" cy="1144440"/>
+            <a:ext cx="10972440" cy="1144800"/>
           </a:xfrm>
           <a:prstGeom prst="rect">
             <a:avLst/>
@@ -2657,6 +2657,12 @@
           <a:bodyPr lIns="0" rIns="0" tIns="0" bIns="0" anchor="ctr"/>
           <a:p>
             <a:pPr algn="ctr"/>
+            <a:r>
+              <a:rPr lang="es-MX" sz="4400">
+                <a:latin typeface="Arial"/>
+              </a:rPr>
+              <a:t>Pulse para editar el formato del texto de título</a:t>
+            </a:r>
             <a:endParaRPr/>
           </a:p>
         </p:txBody>
@@ -2674,7 +2680,7 @@
         <p:spPr>
           <a:xfrm>
             <a:off x="609480" y="1604520"/>
-            <a:ext cx="10972080" cy="3976920"/>
+            <a:ext cx="10972440" cy="3977280"/>
           </a:xfrm>
           <a:prstGeom prst="rect">
             <a:avLst/>
@@ -2689,7 +2695,7 @@
               <a:buChar char=""/>
             </a:pPr>
             <a:r>
-              <a:rPr lang="es-MX">
+              <a:rPr lang="es-MX" sz="3200">
                 <a:latin typeface="Arial"/>
               </a:rPr>
               <a:t>Pulse para editar el formato de esquema del texto</a:t>
@@ -2703,7 +2709,7 @@
               <a:buChar char=""/>
             </a:pPr>
             <a:r>
-              <a:rPr lang="es-MX">
+              <a:rPr lang="es-MX" sz="2800">
                 <a:latin typeface="Arial"/>
               </a:rPr>
               <a:t>Segundo nivel del esquema</a:t>
@@ -2717,7 +2723,7 @@
               <a:buChar char=""/>
             </a:pPr>
             <a:r>
-              <a:rPr lang="es-MX">
+              <a:rPr lang="es-MX" sz="2400">
                 <a:latin typeface="Arial"/>
               </a:rPr>
               <a:t>Tercer nivel del esquema</a:t>
@@ -2731,7 +2737,7 @@
               <a:buChar char=""/>
             </a:pPr>
             <a:r>
-              <a:rPr lang="es-MX">
+              <a:rPr lang="es-MX" sz="2000">
                 <a:latin typeface="Arial"/>
               </a:rPr>
               <a:t>Cuarto nivel del esquema</a:t>
@@ -2745,7 +2751,7 @@
               <a:buChar char=""/>
             </a:pPr>
             <a:r>
-              <a:rPr lang="es-MX">
+              <a:rPr lang="es-MX" sz="2000">
                 <a:latin typeface="Arial"/>
               </a:rPr>
               <a:t>Quinto nivel del esquema</a:t>
@@ -2759,7 +2765,7 @@
               <a:buChar char=""/>
             </a:pPr>
             <a:r>
-              <a:rPr lang="es-MX">
+              <a:rPr lang="es-MX" sz="2000">
                 <a:latin typeface="Arial"/>
               </a:rPr>
               <a:t>Sexto nivel del esquema</a:t>
@@ -2773,7 +2779,7 @@
               <a:buChar char=""/>
             </a:pPr>
             <a:r>
-              <a:rPr lang="es-MX">
+              <a:rPr lang="es-MX" sz="2000">
                 <a:latin typeface="Arial"/>
               </a:rPr>
               <a:t>Séptimo nivel del esquema</a:t>
@@ -3026,7 +3032,7 @@
         <p:spPr>
           <a:xfrm>
             <a:off x="1523880" y="1122480"/>
-            <a:ext cx="9142920" cy="2386440"/>
+            <a:ext cx="9142560" cy="2386080"/>
           </a:xfrm>
           <a:prstGeom prst="rect">
             <a:avLst/>
@@ -3079,7 +3085,7 @@
         <p:spPr>
           <a:xfrm>
             <a:off x="1523880" y="3602160"/>
-            <a:ext cx="9142920" cy="1654560"/>
+            <a:ext cx="9142560" cy="1654200"/>
           </a:xfrm>
           <a:prstGeom prst="rect">
             <a:avLst/>
@@ -3109,7 +3115,7 @@
         <p:spPr>
           <a:xfrm>
             <a:off x="8373960" y="5486400"/>
-            <a:ext cx="3817080" cy="1370520"/>
+            <a:ext cx="3816720" cy="1370160"/>
           </a:xfrm>
           <a:prstGeom prst="rect">
             <a:avLst/>
@@ -3177,7 +3183,7 @@
         <p:spPr>
           <a:xfrm>
             <a:off x="838080" y="365040"/>
-            <a:ext cx="10514520" cy="1324440"/>
+            <a:ext cx="10514160" cy="1324080"/>
           </a:xfrm>
           <a:prstGeom prst="rect">
             <a:avLst/>
@@ -3224,7 +3230,7 @@
         <p:spPr>
           <a:xfrm>
             <a:off x="838080" y="1825560"/>
-            <a:ext cx="10514520" cy="4350240"/>
+            <a:ext cx="10514160" cy="4349880"/>
           </a:xfrm>
           <a:prstGeom prst="rect">
             <a:avLst/>
@@ -3345,7 +3351,7 @@
         <p:spPr>
           <a:xfrm>
             <a:off x="8373960" y="5486400"/>
-            <a:ext cx="3817080" cy="1370520"/>
+            <a:ext cx="3816720" cy="1370160"/>
           </a:xfrm>
           <a:prstGeom prst="rect">
             <a:avLst/>
@@ -3413,7 +3419,7 @@
         <p:spPr>
           <a:xfrm>
             <a:off x="838080" y="365040"/>
-            <a:ext cx="10514520" cy="1324440"/>
+            <a:ext cx="10514160" cy="1324080"/>
           </a:xfrm>
           <a:prstGeom prst="rect">
             <a:avLst/>
@@ -3460,7 +3466,7 @@
         <p:spPr>
           <a:xfrm>
             <a:off x="838080" y="1825560"/>
-            <a:ext cx="10514520" cy="4350240"/>
+            <a:ext cx="10514160" cy="4349880"/>
           </a:xfrm>
           <a:prstGeom prst="rect">
             <a:avLst/>
@@ -3553,7 +3559,7 @@
         <p:spPr>
           <a:xfrm>
             <a:off x="8373960" y="5486400"/>
-            <a:ext cx="3817080" cy="1370520"/>
+            <a:ext cx="3816720" cy="1370160"/>
           </a:xfrm>
           <a:prstGeom prst="rect">
             <a:avLst/>
@@ -3621,7 +3627,7 @@
         <p:spPr>
           <a:xfrm>
             <a:off x="838080" y="365040"/>
-            <a:ext cx="10514520" cy="1324440"/>
+            <a:ext cx="10514160" cy="1324080"/>
           </a:xfrm>
           <a:prstGeom prst="rect">
             <a:avLst/>
@@ -3668,7 +3674,7 @@
         <p:spPr>
           <a:xfrm>
             <a:off x="838080" y="1825560"/>
-            <a:ext cx="10514520" cy="4350240"/>
+            <a:ext cx="10514160" cy="4349880"/>
           </a:xfrm>
           <a:prstGeom prst="rect">
             <a:avLst/>
@@ -3688,9 +3694,12 @@
           <a:bodyPr lIns="90000" rIns="90000" tIns="45000" bIns="45000"/>
           <a:p>
             <a:pPr>
+              <a:lnSpc>
+                <a:spcPct val="100000"/>
+              </a:lnSpc>
               <a:buSzPct val="45000"/>
               <a:buFont typeface="StarSymbol"/>
-              <a:buChar char=""/>
+              <a:buChar char="l"/>
             </a:pPr>
             <a:r>
               <a:rPr lang="es-MX" sz="2800" strike="noStrike">
@@ -3706,9 +3715,12 @@
           </a:p>
           <a:p>
             <a:pPr>
+              <a:lnSpc>
+                <a:spcPct val="100000"/>
+              </a:lnSpc>
               <a:buSzPct val="45000"/>
               <a:buFont typeface="StarSymbol"/>
-              <a:buChar char=""/>
+              <a:buChar char="l"/>
             </a:pPr>
             <a:r>
               <a:rPr lang="es-MX" sz="2800" strike="noStrike">
@@ -3745,7 +3757,7 @@
         <p:spPr>
           <a:xfrm>
             <a:off x="8373960" y="5486400"/>
-            <a:ext cx="3817080" cy="1370520"/>
+            <a:ext cx="3816720" cy="1370160"/>
           </a:xfrm>
           <a:prstGeom prst="rect">
             <a:avLst/>
@@ -3813,7 +3825,7 @@
         <p:spPr>
           <a:xfrm>
             <a:off x="838080" y="365040"/>
-            <a:ext cx="10514520" cy="1324440"/>
+            <a:ext cx="10514160" cy="1324080"/>
           </a:xfrm>
           <a:prstGeom prst="rect">
             <a:avLst/>
@@ -4067,6 +4079,18 @@
                   <a:tcPr/>
                 </a:tc>
                 <a:tc>
+                  <a:txBody>
+                    <a:bodyPr/>
+                    <a:p>
+                      <a:r>
+                        <a:rPr lang="es-MX" sz="2400" strike="noStrike">
+                          <a:latin typeface="Times New Roman"/>
+                        </a:rPr>
+                        <a:t>11/04/16</a:t>
+                      </a:r>
+                      <a:endParaRPr/>
+                    </a:p>
+                  </a:txBody>
                   <a:tcPr/>
                 </a:tc>
               </a:tr>
@@ -4102,6 +4126,18 @@
                   <a:tcPr/>
                 </a:tc>
                 <a:tc>
+                  <a:txBody>
+                    <a:bodyPr/>
+                    <a:p>
+                      <a:r>
+                        <a:rPr lang="es-MX" sz="2400" strike="noStrike">
+                          <a:latin typeface="Times New Roman"/>
+                        </a:rPr>
+                        <a:t>15/04/16</a:t>
+                      </a:r>
+                      <a:endParaRPr/>
+                    </a:p>
+                  </a:txBody>
                   <a:tcPr/>
                 </a:tc>
               </a:tr>
@@ -4118,7 +4154,7 @@
         <p:spPr>
           <a:xfrm>
             <a:off x="4699080" y="2381040"/>
-            <a:ext cx="183600" cy="368280"/>
+            <a:ext cx="183240" cy="367920"/>
           </a:xfrm>
           <a:prstGeom prst="rect">
             <a:avLst/>
@@ -4148,7 +4184,7 @@
         <p:spPr>
           <a:xfrm>
             <a:off x="8373960" y="5486400"/>
-            <a:ext cx="3817080" cy="1370520"/>
+            <a:ext cx="3816720" cy="1370160"/>
           </a:xfrm>
           <a:prstGeom prst="rect">
             <a:avLst/>
@@ -4220,7 +4256,7 @@
         <p:spPr>
           <a:xfrm>
             <a:off x="8373960" y="5486400"/>
-            <a:ext cx="3817080" cy="1370520"/>
+            <a:ext cx="3816720" cy="1370160"/>
           </a:xfrm>
           <a:prstGeom prst="rect">
             <a:avLst/>
@@ -4239,7 +4275,7 @@
         <p:spPr>
           <a:xfrm>
             <a:off x="1891800" y="378720"/>
-            <a:ext cx="8307720" cy="760680"/>
+            <a:ext cx="8307360" cy="760320"/>
           </a:xfrm>
           <a:prstGeom prst="rect">
             <a:avLst/>
@@ -4286,7 +4322,7 @@
         <p:spPr>
           <a:xfrm>
             <a:off x="5893200" y="3576240"/>
-            <a:ext cx="3303000" cy="934560"/>
+            <a:ext cx="3302640" cy="934200"/>
           </a:xfrm>
           <a:custGeom>
             <a:avLst/>
@@ -4340,7 +4376,7 @@
         <p:spPr>
           <a:xfrm>
             <a:off x="5893200" y="3576240"/>
-            <a:ext cx="1094040" cy="933480"/>
+            <a:ext cx="1093680" cy="933120"/>
           </a:xfrm>
           <a:custGeom>
             <a:avLst/>
@@ -4394,7 +4430,7 @@
         <p:spPr>
           <a:xfrm>
             <a:off x="4853160" y="3576240"/>
-            <a:ext cx="1038960" cy="933480"/>
+            <a:ext cx="1038600" cy="933120"/>
           </a:xfrm>
           <a:custGeom>
             <a:avLst/>
@@ -4448,7 +4484,7 @@
         <p:spPr>
           <a:xfrm>
             <a:off x="2718000" y="3576240"/>
-            <a:ext cx="3174120" cy="933480"/>
+            <a:ext cx="3173760" cy="933120"/>
           </a:xfrm>
           <a:custGeom>
             <a:avLst/>
@@ -4502,7 +4538,7 @@
         <p:spPr>
           <a:xfrm>
             <a:off x="5847480" y="2125800"/>
-            <a:ext cx="90360" cy="582120"/>
+            <a:ext cx="90000" cy="581760"/>
           </a:xfrm>
           <a:custGeom>
             <a:avLst/>
@@ -4556,11 +4592,11 @@
         <p:spPr>
           <a:xfrm>
             <a:off x="4042800" y="1195920"/>
-            <a:ext cx="3699720" cy="928800"/>
+            <a:ext cx="3699360" cy="928440"/>
           </a:xfrm>
           <a:prstGeom prst="roundRect">
             <a:avLst>
-              <a:gd name="adj" fmla="val 13737"/>
+              <a:gd name="adj" fmla="val 13767"/>
             </a:avLst>
           </a:prstGeom>
           <a:solidFill>
@@ -4602,11 +4638,11 @@
         <p:spPr>
           <a:xfrm>
             <a:off x="4287960" y="1428840"/>
-            <a:ext cx="3699720" cy="928800"/>
+            <a:ext cx="3699360" cy="928440"/>
           </a:xfrm>
           <a:prstGeom prst="roundRect">
             <a:avLst>
-              <a:gd name="adj" fmla="val 13737"/>
+              <a:gd name="adj" fmla="val 13767"/>
             </a:avLst>
           </a:prstGeom>
           <a:solidFill>
@@ -4662,11 +4698,11 @@
         <p:spPr>
           <a:xfrm>
             <a:off x="4590000" y="2709000"/>
-            <a:ext cx="2605680" cy="866160"/>
+            <a:ext cx="2605320" cy="865800"/>
           </a:xfrm>
           <a:prstGeom prst="roundRect">
             <a:avLst>
-              <a:gd name="adj" fmla="val 13737"/>
+              <a:gd name="adj" fmla="val 13767"/>
             </a:avLst>
           </a:prstGeom>
           <a:gradFill>
@@ -4731,11 +4767,11 @@
         <p:spPr>
           <a:xfrm>
             <a:off x="4835160" y="2942280"/>
-            <a:ext cx="2605680" cy="866160"/>
+            <a:ext cx="2605320" cy="865800"/>
           </a:xfrm>
           <a:prstGeom prst="roundRect">
             <a:avLst>
-              <a:gd name="adj" fmla="val 13737"/>
+              <a:gd name="adj" fmla="val 13767"/>
             </a:avLst>
           </a:prstGeom>
           <a:solidFill>
@@ -4791,11 +4827,11 @@
         <p:spPr>
           <a:xfrm>
             <a:off x="1895760" y="4510800"/>
-            <a:ext cx="1643760" cy="1009080"/>
+            <a:ext cx="1643400" cy="1008720"/>
           </a:xfrm>
           <a:prstGeom prst="roundRect">
             <a:avLst>
-              <a:gd name="adj" fmla="val 13737"/>
+              <a:gd name="adj" fmla="val 13767"/>
             </a:avLst>
           </a:prstGeom>
           <a:gradFill>
@@ -4860,11 +4896,11 @@
         <p:spPr>
           <a:xfrm>
             <a:off x="2140920" y="4743720"/>
-            <a:ext cx="1643760" cy="1009080"/>
+            <a:ext cx="1643400" cy="1008720"/>
           </a:xfrm>
           <a:prstGeom prst="roundRect">
             <a:avLst>
-              <a:gd name="adj" fmla="val 13737"/>
+              <a:gd name="adj" fmla="val 13767"/>
             </a:avLst>
           </a:prstGeom>
           <a:solidFill>
@@ -4920,11 +4956,11 @@
         <p:spPr>
           <a:xfrm>
             <a:off x="4030920" y="4510800"/>
-            <a:ext cx="1643760" cy="1009080"/>
+            <a:ext cx="1643400" cy="1008720"/>
           </a:xfrm>
           <a:prstGeom prst="roundRect">
             <a:avLst>
-              <a:gd name="adj" fmla="val 13737"/>
+              <a:gd name="adj" fmla="val 13767"/>
             </a:avLst>
           </a:prstGeom>
           <a:gradFill>
@@ -4989,11 +5025,11 @@
         <p:spPr>
           <a:xfrm>
             <a:off x="4276080" y="4743720"/>
-            <a:ext cx="1643760" cy="1009080"/>
+            <a:ext cx="1643400" cy="1008720"/>
           </a:xfrm>
           <a:prstGeom prst="roundRect">
             <a:avLst>
-              <a:gd name="adj" fmla="val 13737"/>
+              <a:gd name="adj" fmla="val 13767"/>
             </a:avLst>
           </a:prstGeom>
           <a:solidFill>
@@ -5049,11 +5085,11 @@
         <p:spPr>
           <a:xfrm>
             <a:off x="6166080" y="4510800"/>
-            <a:ext cx="1643760" cy="1009080"/>
+            <a:ext cx="1643400" cy="1008720"/>
           </a:xfrm>
           <a:prstGeom prst="roundRect">
             <a:avLst>
-              <a:gd name="adj" fmla="val 13737"/>
+              <a:gd name="adj" fmla="val 13767"/>
             </a:avLst>
           </a:prstGeom>
           <a:gradFill>
@@ -5118,11 +5154,11 @@
         <p:spPr>
           <a:xfrm>
             <a:off x="6411240" y="4743720"/>
-            <a:ext cx="1643760" cy="1009080"/>
+            <a:ext cx="1643400" cy="1008720"/>
           </a:xfrm>
           <a:prstGeom prst="roundRect">
             <a:avLst>
-              <a:gd name="adj" fmla="val 13737"/>
+              <a:gd name="adj" fmla="val 13767"/>
             </a:avLst>
           </a:prstGeom>
           <a:solidFill>
@@ -5178,11 +5214,11 @@
         <p:spPr>
           <a:xfrm>
             <a:off x="8375040" y="4511880"/>
-            <a:ext cx="1643760" cy="1009080"/>
+            <a:ext cx="1643400" cy="1008720"/>
           </a:xfrm>
           <a:prstGeom prst="roundRect">
             <a:avLst>
-              <a:gd name="adj" fmla="val 13737"/>
+              <a:gd name="adj" fmla="val 13767"/>
             </a:avLst>
           </a:prstGeom>
           <a:gradFill>
@@ -5247,11 +5283,11 @@
         <p:spPr>
           <a:xfrm>
             <a:off x="8620200" y="4744800"/>
-            <a:ext cx="1643760" cy="1009080"/>
+            <a:ext cx="1643400" cy="1008720"/>
           </a:xfrm>
           <a:prstGeom prst="roundRect">
             <a:avLst>
-              <a:gd name="adj" fmla="val 13737"/>
+              <a:gd name="adj" fmla="val 13767"/>
             </a:avLst>
           </a:prstGeom>
           <a:solidFill>
@@ -5356,7 +5392,7 @@
         <p:spPr>
           <a:xfrm>
             <a:off x="838080" y="365040"/>
-            <a:ext cx="10514520" cy="1324440"/>
+            <a:ext cx="10514160" cy="1324080"/>
           </a:xfrm>
           <a:prstGeom prst="rect">
             <a:avLst/>
@@ -5403,7 +5439,7 @@
         <p:spPr>
           <a:xfrm>
             <a:off x="838080" y="1825560"/>
-            <a:ext cx="10514520" cy="4350240"/>
+            <a:ext cx="10514160" cy="4349880"/>
           </a:xfrm>
           <a:prstGeom prst="rect">
             <a:avLst/>
@@ -5453,7 +5489,7 @@
                 <a:spcPct val="90000"/>
               </a:lnSpc>
               <a:buFont typeface="StarSymbol"/>
-              <a:buChar char=""/>
+              <a:buChar char="l"/>
             </a:pPr>
             <a:r>
               <a:rPr lang="es-MX" sz="2400" strike="noStrike">
@@ -5473,7 +5509,7 @@
                 <a:spcPct val="90000"/>
               </a:lnSpc>
               <a:buFont typeface="StarSymbol"/>
-              <a:buChar char=""/>
+              <a:buChar char="l"/>
             </a:pPr>
             <a:r>
               <a:rPr lang="es-MX" sz="2400" strike="noStrike">
@@ -5493,7 +5529,7 @@
                 <a:spcPct val="90000"/>
               </a:lnSpc>
               <a:buFont typeface="StarSymbol"/>
-              <a:buChar char=""/>
+              <a:buChar char="l"/>
             </a:pPr>
             <a:r>
               <a:rPr lang="es-MX" sz="2400" strike="noStrike">
@@ -5513,7 +5549,7 @@
                 <a:spcPct val="90000"/>
               </a:lnSpc>
               <a:buFont typeface="StarSymbol"/>
-              <a:buChar char=""/>
+              <a:buChar char="l"/>
             </a:pPr>
             <a:r>
               <a:rPr lang="es-MX" sz="2400" strike="noStrike">
@@ -5533,7 +5569,7 @@
                 <a:spcPct val="90000"/>
               </a:lnSpc>
               <a:buFont typeface="StarSymbol"/>
-              <a:buChar char=""/>
+              <a:buChar char="l"/>
             </a:pPr>
             <a:r>
               <a:rPr lang="es-MX" sz="2400" strike="noStrike">
@@ -5610,7 +5646,7 @@
         <p:spPr>
           <a:xfrm>
             <a:off x="8524080" y="5594760"/>
-            <a:ext cx="3666960" cy="1262160"/>
+            <a:ext cx="3666600" cy="1261800"/>
           </a:xfrm>
           <a:prstGeom prst="rect">
             <a:avLst/>

</xml_diff>